<commit_message>
tweaks to beamforming taxonomy
</commit_message>
<xml_diff>
--- a/powerpoints/beamforming_taxonomy.pptx
+++ b/powerpoints/beamforming_taxonomy.pptx
@@ -1739,7 +1739,7 @@
         <p:fade/>
       </p:transition>
     </mc:Choice>
-    <mc:Fallback xmlns:ahyp="http://schemas.microsoft.com/office/drawing/2018/hyperlinkcolor" xmlns:p15="http://schemas.microsoft.com/office/powerpoint/2012/main" xmlns:com="http://schemas.openxmlformats.org/drawingml/2006/compatibility" xmlns:pvml="urn:schemas-microsoft-com:office:powerpoint" xmlns:v="urn:schemas-microsoft-com:vml" xmlns:o="urn:schemas-microsoft-com:office:office" xmlns:dgm="http://schemas.openxmlformats.org/drawingml/2006/diagram" xmlns:c="http://schemas.openxmlformats.org/drawingml/2006/chart" xmlns:mv="urn:schemas-microsoft-com:mac:vml" xmlns="">
+    <mc:Fallback xmlns="" xmlns:mv="urn:schemas-microsoft-com:mac:vml" xmlns:c="http://schemas.openxmlformats.org/drawingml/2006/chart" xmlns:dgm="http://schemas.openxmlformats.org/drawingml/2006/diagram" xmlns:o="urn:schemas-microsoft-com:office:office" xmlns:v="urn:schemas-microsoft-com:vml" xmlns:pvml="urn:schemas-microsoft-com:office:powerpoint" xmlns:com="http://schemas.openxmlformats.org/drawingml/2006/compatibility" xmlns:p15="http://schemas.microsoft.com/office/powerpoint/2012/main" xmlns:ahyp="http://schemas.microsoft.com/office/drawing/2018/hyperlinkcolor">
       <p:transition spd="slow">
         <p:fade/>
       </p:transition>
@@ -2743,7 +2743,7 @@
         <p:fade/>
       </p:transition>
     </mc:Choice>
-    <mc:Fallback xmlns:ahyp="http://schemas.microsoft.com/office/drawing/2018/hyperlinkcolor" xmlns:p15="http://schemas.microsoft.com/office/powerpoint/2012/main" xmlns:com="http://schemas.openxmlformats.org/drawingml/2006/compatibility" xmlns:pvml="urn:schemas-microsoft-com:office:powerpoint" xmlns:v="urn:schemas-microsoft-com:vml" xmlns:o="urn:schemas-microsoft-com:office:office" xmlns:dgm="http://schemas.openxmlformats.org/drawingml/2006/diagram" xmlns:c="http://schemas.openxmlformats.org/drawingml/2006/chart" xmlns:mv="urn:schemas-microsoft-com:mac:vml" xmlns="">
+    <mc:Fallback xmlns="" xmlns:mv="urn:schemas-microsoft-com:mac:vml" xmlns:c="http://schemas.openxmlformats.org/drawingml/2006/chart" xmlns:dgm="http://schemas.openxmlformats.org/drawingml/2006/diagram" xmlns:o="urn:schemas-microsoft-com:office:office" xmlns:v="urn:schemas-microsoft-com:vml" xmlns:pvml="urn:schemas-microsoft-com:office:powerpoint" xmlns:com="http://schemas.openxmlformats.org/drawingml/2006/compatibility" xmlns:p15="http://schemas.microsoft.com/office/powerpoint/2012/main" xmlns:ahyp="http://schemas.microsoft.com/office/drawing/2018/hyperlinkcolor">
       <p:transition spd="slow">
         <p:fade/>
       </p:transition>
@@ -3574,7 +3574,7 @@
         <p:fade/>
       </p:transition>
     </mc:Choice>
-    <mc:Fallback xmlns:ahyp="http://schemas.microsoft.com/office/drawing/2018/hyperlinkcolor" xmlns:p15="http://schemas.microsoft.com/office/powerpoint/2012/main" xmlns:com="http://schemas.openxmlformats.org/drawingml/2006/compatibility" xmlns:pvml="urn:schemas-microsoft-com:office:powerpoint" xmlns:v="urn:schemas-microsoft-com:vml" xmlns:o="urn:schemas-microsoft-com:office:office" xmlns:dgm="http://schemas.openxmlformats.org/drawingml/2006/diagram" xmlns:c="http://schemas.openxmlformats.org/drawingml/2006/chart" xmlns:mv="urn:schemas-microsoft-com:mac:vml" xmlns="">
+    <mc:Fallback xmlns="" xmlns:mv="urn:schemas-microsoft-com:mac:vml" xmlns:c="http://schemas.openxmlformats.org/drawingml/2006/chart" xmlns:dgm="http://schemas.openxmlformats.org/drawingml/2006/diagram" xmlns:o="urn:schemas-microsoft-com:office:office" xmlns:v="urn:schemas-microsoft-com:vml" xmlns:pvml="urn:schemas-microsoft-com:office:powerpoint" xmlns:com="http://schemas.openxmlformats.org/drawingml/2006/compatibility" xmlns:p15="http://schemas.microsoft.com/office/powerpoint/2012/main" xmlns:ahyp="http://schemas.microsoft.com/office/drawing/2018/hyperlinkcolor">
       <p:transition spd="slow">
         <p:fade/>
       </p:transition>
@@ -4347,7 +4347,7 @@
         <p:fade/>
       </p:transition>
     </mc:Choice>
-    <mc:Fallback xmlns:ahyp="http://schemas.microsoft.com/office/drawing/2018/hyperlinkcolor" xmlns:p15="http://schemas.microsoft.com/office/powerpoint/2012/main" xmlns:com="http://schemas.openxmlformats.org/drawingml/2006/compatibility" xmlns:pvml="urn:schemas-microsoft-com:office:powerpoint" xmlns:v="urn:schemas-microsoft-com:vml" xmlns:o="urn:schemas-microsoft-com:office:office" xmlns:dgm="http://schemas.openxmlformats.org/drawingml/2006/diagram" xmlns:c="http://schemas.openxmlformats.org/drawingml/2006/chart" xmlns:mv="urn:schemas-microsoft-com:mac:vml" xmlns="">
+    <mc:Fallback xmlns="" xmlns:mv="urn:schemas-microsoft-com:mac:vml" xmlns:c="http://schemas.openxmlformats.org/drawingml/2006/chart" xmlns:dgm="http://schemas.openxmlformats.org/drawingml/2006/diagram" xmlns:o="urn:schemas-microsoft-com:office:office" xmlns:v="urn:schemas-microsoft-com:vml" xmlns:pvml="urn:schemas-microsoft-com:office:powerpoint" xmlns:com="http://schemas.openxmlformats.org/drawingml/2006/compatibility" xmlns:p15="http://schemas.microsoft.com/office/powerpoint/2012/main" xmlns:ahyp="http://schemas.microsoft.com/office/drawing/2018/hyperlinkcolor">
       <p:transition spd="slow">
         <p:fade/>
       </p:transition>
@@ -17008,7 +17008,7 @@
         <p:fade/>
       </p:transition>
     </mc:Choice>
-    <mc:Fallback xmlns:ahyp="http://schemas.microsoft.com/office/drawing/2018/hyperlinkcolor" xmlns:p15="http://schemas.microsoft.com/office/powerpoint/2012/main" xmlns:com="http://schemas.openxmlformats.org/drawingml/2006/compatibility" xmlns:pvml="urn:schemas-microsoft-com:office:powerpoint" xmlns:v="urn:schemas-microsoft-com:vml" xmlns:o="urn:schemas-microsoft-com:office:office" xmlns:dgm="http://schemas.openxmlformats.org/drawingml/2006/diagram" xmlns:c="http://schemas.openxmlformats.org/drawingml/2006/chart" xmlns:mv="urn:schemas-microsoft-com:mac:vml" xmlns="">
+    <mc:Fallback xmlns="" xmlns:mv="urn:schemas-microsoft-com:mac:vml" xmlns:c="http://schemas.openxmlformats.org/drawingml/2006/chart" xmlns:dgm="http://schemas.openxmlformats.org/drawingml/2006/diagram" xmlns:o="urn:schemas-microsoft-com:office:office" xmlns:v="urn:schemas-microsoft-com:vml" xmlns:pvml="urn:schemas-microsoft-com:office:powerpoint" xmlns:com="http://schemas.openxmlformats.org/drawingml/2006/compatibility" xmlns:p15="http://schemas.microsoft.com/office/powerpoint/2012/main" xmlns:ahyp="http://schemas.microsoft.com/office/drawing/2018/hyperlinkcolor">
       <p:transition spd="slow">
         <p:fade/>
       </p:transition>
@@ -17713,7 +17713,7 @@
         <p:fade/>
       </p:transition>
     </mc:Choice>
-    <mc:Fallback xmlns:ahyp="http://schemas.microsoft.com/office/drawing/2018/hyperlinkcolor" xmlns:p15="http://schemas.microsoft.com/office/powerpoint/2012/main" xmlns:com="http://schemas.openxmlformats.org/drawingml/2006/compatibility" xmlns:pvml="urn:schemas-microsoft-com:office:powerpoint" xmlns:v="urn:schemas-microsoft-com:vml" xmlns:o="urn:schemas-microsoft-com:office:office" xmlns:dgm="http://schemas.openxmlformats.org/drawingml/2006/diagram" xmlns:c="http://schemas.openxmlformats.org/drawingml/2006/chart" xmlns:mv="urn:schemas-microsoft-com:mac:vml" xmlns="">
+    <mc:Fallback xmlns="" xmlns:mv="urn:schemas-microsoft-com:mac:vml" xmlns:c="http://schemas.openxmlformats.org/drawingml/2006/chart" xmlns:dgm="http://schemas.openxmlformats.org/drawingml/2006/diagram" xmlns:o="urn:schemas-microsoft-com:office:office" xmlns:v="urn:schemas-microsoft-com:vml" xmlns:pvml="urn:schemas-microsoft-com:office:powerpoint" xmlns:com="http://schemas.openxmlformats.org/drawingml/2006/compatibility" xmlns:p15="http://schemas.microsoft.com/office/powerpoint/2012/main" xmlns:ahyp="http://schemas.microsoft.com/office/drawing/2018/hyperlinkcolor">
       <p:transition spd="slow">
         <p:fade/>
       </p:transition>
@@ -19887,8 +19887,8 @@
         </p:nvSpPr>
         <p:spPr>
           <a:xfrm>
-            <a:off x="3589100" y="1708420"/>
-            <a:ext cx="944700" cy="223500"/>
+            <a:off x="3788450" y="1752934"/>
+            <a:ext cx="546000" cy="173561"/>
           </a:xfrm>
           <a:prstGeom prst="rect">
             <a:avLst/>
@@ -19916,14 +19916,14 @@
               <a:buNone/>
             </a:pPr>
             <a:r>
-              <a:rPr lang="en" sz="900" i="0" u="none" strike="noStrike" cap="none">
+              <a:rPr lang="en" sz="900" i="0" u="none" strike="noStrike" cap="none" dirty="0">
                 <a:solidFill>
                   <a:schemeClr val="lt1"/>
                 </a:solidFill>
               </a:rPr>
-              <a:t>LMS/Griffiths</a:t>
+              <a:t>LMS</a:t>
             </a:r>
-            <a:endParaRPr sz="400"/>
+            <a:endParaRPr sz="400" dirty="0"/>
           </a:p>
         </p:txBody>
       </p:sp>
@@ -20116,7 +20116,7 @@
               <a:buNone/>
             </a:pPr>
             <a:r>
-              <a:rPr lang="en" sz="900" b="0" i="0" u="none" strike="noStrike" cap="none">
+              <a:rPr lang="en" sz="900" b="0" i="0" u="none" strike="noStrike" cap="none" dirty="0">
                 <a:solidFill>
                   <a:schemeClr val="lt1"/>
                 </a:solidFill>
@@ -20127,7 +20127,7 @@
               </a:rPr>
               <a:t>Constant Modulus</a:t>
             </a:r>
-            <a:endParaRPr sz="400"/>
+            <a:endParaRPr sz="400" dirty="0"/>
           </a:p>
         </p:txBody>
       </p:sp>
@@ -21207,7 +21207,7 @@
         </p:nvSpPr>
         <p:spPr>
           <a:xfrm>
-            <a:off x="2187680" y="469091"/>
+            <a:off x="2094194" y="468238"/>
             <a:ext cx="2827500" cy="239700"/>
           </a:xfrm>
           <a:prstGeom prst="rect">
@@ -21224,7 +21224,7 @@
           </a:bodyPr>
           <a:lstStyle/>
           <a:p>
-            <a:pPr marL="0" marR="0" lvl="0" indent="0" algn="l" rtl="0">
+            <a:pPr marL="0" marR="0" lvl="0" indent="0" algn="ctr" rtl="0">
               <a:spcBef>
                 <a:spcPts val="0"/>
               </a:spcBef>
@@ -21234,7 +21234,7 @@
               <a:buNone/>
             </a:pPr>
             <a:r>
-              <a:rPr lang="en" sz="1400" b="1" i="0" u="none" strike="noStrike" cap="none">
+              <a:rPr lang="en" sz="1400" b="1" i="0" u="none" strike="noStrike" cap="none" dirty="0">
                 <a:solidFill>
                   <a:schemeClr val="dk1"/>
                 </a:solidFill>
@@ -21243,9 +21243,9 @@
                 <a:cs typeface="Arial"/>
                 <a:sym typeface="Arial"/>
               </a:rPr>
-              <a:t>Beamforming Techniques</a:t>
+              <a:t>Beamformers</a:t>
             </a:r>
-            <a:endParaRPr sz="400"/>
+            <a:endParaRPr sz="400" dirty="0"/>
           </a:p>
         </p:txBody>
       </p:sp>
@@ -22454,7 +22454,7 @@
         </p:nvSpPr>
         <p:spPr>
           <a:xfrm>
-            <a:off x="4467059" y="1677639"/>
+            <a:off x="4269175" y="1722498"/>
             <a:ext cx="82200" cy="82200"/>
           </a:xfrm>
           <a:prstGeom prst="ellipse">
@@ -22651,19 +22651,19 @@
         </p:nvSpPr>
         <p:spPr>
           <a:xfrm>
-            <a:off x="2888300" y="4323342"/>
-            <a:ext cx="1212600" cy="454200"/>
+            <a:off x="2351588" y="4390559"/>
+            <a:ext cx="2419398" cy="356026"/>
           </a:xfrm>
           <a:prstGeom prst="roundRect">
             <a:avLst>
-              <a:gd name="adj" fmla="val 32501"/>
+              <a:gd name="adj" fmla="val 40365"/>
             </a:avLst>
           </a:prstGeom>
-          <a:solidFill>
-            <a:srgbClr val="2F6690"/>
-          </a:solidFill>
+          <a:noFill/>
           <a:ln>
-            <a:noFill/>
+            <a:solidFill>
+              <a:schemeClr val="tx1"/>
+            </a:solidFill>
           </a:ln>
         </p:spPr>
         <p:txBody>
@@ -22686,16 +22686,16 @@
               <a:buNone/>
             </a:pPr>
             <a:r>
-              <a:rPr lang="en" sz="900" b="1">
+              <a:rPr lang="en" sz="900" b="1" dirty="0">
                 <a:solidFill>
-                  <a:schemeClr val="lt1"/>
+                  <a:sysClr val="windowText" lastClr="000000"/>
                 </a:solidFill>
               </a:rPr>
               <a:t>Space-Time Adaptive Processing (STAP)</a:t>
             </a:r>
-            <a:endParaRPr sz="100">
+            <a:endParaRPr sz="100" dirty="0">
               <a:solidFill>
-                <a:schemeClr val="lt1"/>
+                <a:sysClr val="windowText" lastClr="000000"/>
               </a:solidFill>
             </a:endParaRPr>
           </a:p>
@@ -23109,7 +23109,7 @@
         <p:spPr>
           <a:xfrm>
             <a:off x="3278701" y="2031423"/>
-            <a:ext cx="109414" cy="82200"/>
+            <a:ext cx="79849" cy="82200"/>
           </a:xfrm>
           <a:prstGeom prst="ellipse">
             <a:avLst/>
@@ -23162,8 +23162,8 @@
         </p:nvSpPr>
         <p:spPr>
           <a:xfrm>
-            <a:off x="3369415" y="3618922"/>
-            <a:ext cx="109414" cy="82200"/>
+            <a:off x="3398541" y="3618922"/>
+            <a:ext cx="80287" cy="82200"/>
           </a:xfrm>
           <a:prstGeom prst="ellipse">
             <a:avLst/>

</xml_diff>